<commit_message>
Mici modificari + adaugare calcule
</commit_message>
<xml_diff>
--- a/Template etichete modul senzor.pptx
+++ b/Template etichete modul senzor.pptx
@@ -104,6 +104,11 @@
       </a:defRPr>
     </a:lvl9pPr>
   </p:defaultTextStyle>
+  <p:extLst>
+    <p:ext uri="{EFAFB233-063F-42B5-8137-9DF3F51BA10A}">
+      <p15:sldGuideLst xmlns:p15="http://schemas.microsoft.com/office/powerpoint/2012/main"/>
+    </p:ext>
+  </p:extLst>
 </p:presentation>
 </file>
 
@@ -256,7 +261,7 @@
           <a:p>
             <a:fld id="{34755551-83DF-4ECD-B6A6-BE8124057A96}" type="datetimeFigureOut">
               <a:rPr lang="en-US" smtClean="0"/>
-              <a:t>3/28/2021</a:t>
+              <a:t>4/25/2021</a:t>
             </a:fld>
             <a:endParaRPr lang="en-US"/>
           </a:p>
@@ -456,7 +461,7 @@
           <a:p>
             <a:fld id="{34755551-83DF-4ECD-B6A6-BE8124057A96}" type="datetimeFigureOut">
               <a:rPr lang="en-US" smtClean="0"/>
-              <a:t>3/28/2021</a:t>
+              <a:t>4/25/2021</a:t>
             </a:fld>
             <a:endParaRPr lang="en-US"/>
           </a:p>
@@ -666,7 +671,7 @@
           <a:p>
             <a:fld id="{34755551-83DF-4ECD-B6A6-BE8124057A96}" type="datetimeFigureOut">
               <a:rPr lang="en-US" smtClean="0"/>
-              <a:t>3/28/2021</a:t>
+              <a:t>4/25/2021</a:t>
             </a:fld>
             <a:endParaRPr lang="en-US"/>
           </a:p>
@@ -866,7 +871,7 @@
           <a:p>
             <a:fld id="{34755551-83DF-4ECD-B6A6-BE8124057A96}" type="datetimeFigureOut">
               <a:rPr lang="en-US" smtClean="0"/>
-              <a:t>3/28/2021</a:t>
+              <a:t>4/25/2021</a:t>
             </a:fld>
             <a:endParaRPr lang="en-US"/>
           </a:p>
@@ -1142,7 +1147,7 @@
           <a:p>
             <a:fld id="{34755551-83DF-4ECD-B6A6-BE8124057A96}" type="datetimeFigureOut">
               <a:rPr lang="en-US" smtClean="0"/>
-              <a:t>3/28/2021</a:t>
+              <a:t>4/25/2021</a:t>
             </a:fld>
             <a:endParaRPr lang="en-US"/>
           </a:p>
@@ -1410,7 +1415,7 @@
           <a:p>
             <a:fld id="{34755551-83DF-4ECD-B6A6-BE8124057A96}" type="datetimeFigureOut">
               <a:rPr lang="en-US" smtClean="0"/>
-              <a:t>3/28/2021</a:t>
+              <a:t>4/25/2021</a:t>
             </a:fld>
             <a:endParaRPr lang="en-US"/>
           </a:p>
@@ -1825,7 +1830,7 @@
           <a:p>
             <a:fld id="{34755551-83DF-4ECD-B6A6-BE8124057A96}" type="datetimeFigureOut">
               <a:rPr lang="en-US" smtClean="0"/>
-              <a:t>3/28/2021</a:t>
+              <a:t>4/25/2021</a:t>
             </a:fld>
             <a:endParaRPr lang="en-US"/>
           </a:p>
@@ -1967,7 +1972,7 @@
           <a:p>
             <a:fld id="{34755551-83DF-4ECD-B6A6-BE8124057A96}" type="datetimeFigureOut">
               <a:rPr lang="en-US" smtClean="0"/>
-              <a:t>3/28/2021</a:t>
+              <a:t>4/25/2021</a:t>
             </a:fld>
             <a:endParaRPr lang="en-US"/>
           </a:p>
@@ -2080,7 +2085,7 @@
           <a:p>
             <a:fld id="{34755551-83DF-4ECD-B6A6-BE8124057A96}" type="datetimeFigureOut">
               <a:rPr lang="en-US" smtClean="0"/>
-              <a:t>3/28/2021</a:t>
+              <a:t>4/25/2021</a:t>
             </a:fld>
             <a:endParaRPr lang="en-US"/>
           </a:p>
@@ -2393,7 +2398,7 @@
           <a:p>
             <a:fld id="{34755551-83DF-4ECD-B6A6-BE8124057A96}" type="datetimeFigureOut">
               <a:rPr lang="en-US" smtClean="0"/>
-              <a:t>3/28/2021</a:t>
+              <a:t>4/25/2021</a:t>
             </a:fld>
             <a:endParaRPr lang="en-US"/>
           </a:p>
@@ -2682,7 +2687,7 @@
           <a:p>
             <a:fld id="{34755551-83DF-4ECD-B6A6-BE8124057A96}" type="datetimeFigureOut">
               <a:rPr lang="en-US" smtClean="0"/>
-              <a:t>3/28/2021</a:t>
+              <a:t>4/25/2021</a:t>
             </a:fld>
             <a:endParaRPr lang="en-US"/>
           </a:p>
@@ -2925,7 +2930,7 @@
           <a:p>
             <a:fld id="{34755551-83DF-4ECD-B6A6-BE8124057A96}" type="datetimeFigureOut">
               <a:rPr lang="en-US" smtClean="0"/>
-              <a:t>3/28/2021</a:t>
+              <a:t>4/25/2021</a:t>
             </a:fld>
             <a:endParaRPr lang="en-US"/>
           </a:p>
@@ -3342,6 +3347,36 @@
           <a:chExt cx="0" cy="0"/>
         </a:xfrm>
       </p:grpSpPr>
+      <p:pic>
+        <p:nvPicPr>
+          <p:cNvPr id="20" name="Imagine 19">
+            <a:extLst>
+              <a:ext uri="{FF2B5EF4-FFF2-40B4-BE49-F238E27FC236}">
+                <a16:creationId xmlns:a16="http://schemas.microsoft.com/office/drawing/2014/main" id="{7F20C2F6-3285-436E-A1B6-29BCAC6961EF}"/>
+              </a:ext>
+            </a:extLst>
+          </p:cNvPr>
+          <p:cNvPicPr>
+            <a:picLocks noChangeAspect="1"/>
+          </p:cNvPicPr>
+          <p:nvPr/>
+        </p:nvPicPr>
+        <p:blipFill>
+          <a:blip r:embed="rId2"/>
+          <a:stretch>
+            <a:fillRect/>
+          </a:stretch>
+        </p:blipFill>
+        <p:spPr>
+          <a:xfrm>
+            <a:off x="444501" y="0"/>
+            <a:ext cx="11328400" cy="6858000"/>
+          </a:xfrm>
+          <a:prstGeom prst="rect">
+            <a:avLst/>
+          </a:prstGeom>
+        </p:spPr>
+      </p:pic>
       <p:sp>
         <p:nvSpPr>
           <p:cNvPr id="16" name="Dreptunghi 15">
@@ -3356,7 +3391,7 @@
         </p:nvSpPr>
         <p:spPr>
           <a:xfrm>
-            <a:off x="1519236" y="4438650"/>
+            <a:off x="1226620" y="4307729"/>
             <a:ext cx="909390" cy="911859"/>
           </a:xfrm>
           <a:prstGeom prst="rect">
@@ -3464,7 +3499,7 @@
         </p:nvSpPr>
         <p:spPr>
           <a:xfrm>
-            <a:off x="4635610" y="6209969"/>
+            <a:off x="4648311" y="6197752"/>
             <a:ext cx="1460390" cy="524206"/>
           </a:xfrm>
           <a:prstGeom prst="rect">
@@ -3514,7 +3549,7 @@
         </p:nvSpPr>
         <p:spPr>
           <a:xfrm>
-            <a:off x="7654186" y="5923432"/>
+            <a:off x="8023116" y="5749592"/>
             <a:ext cx="1460390" cy="548640"/>
           </a:xfrm>
           <a:prstGeom prst="rect">
@@ -3609,13 +3644,15 @@
               </a:ext>
             </a:extLst>
           </p:cNvPr>
-          <p:cNvCxnSpPr/>
+          <p:cNvCxnSpPr>
+            <a:cxnSpLocks/>
+          </p:cNvCxnSpPr>
           <p:nvPr/>
         </p:nvCxnSpPr>
         <p:spPr>
           <a:xfrm flipV="1">
-            <a:off x="7429500" y="4610100"/>
-            <a:ext cx="361950" cy="371475"/>
+            <a:off x="7485987" y="4399996"/>
+            <a:ext cx="537129" cy="581580"/>
           </a:xfrm>
           <a:prstGeom prst="straightConnector1">
             <a:avLst/>
@@ -3853,7 +3890,7 @@
         </p:nvSpPr>
         <p:spPr>
           <a:xfrm>
-            <a:off x="5944655" y="476581"/>
+            <a:off x="6020855" y="420205"/>
             <a:ext cx="980661" cy="524206"/>
           </a:xfrm>
           <a:prstGeom prst="rect">
@@ -3998,13 +4035,16 @@
               </a:ext>
             </a:extLst>
           </p:cNvPr>
-          <p:cNvCxnSpPr/>
+          <p:cNvCxnSpPr>
+            <a:cxnSpLocks/>
+            <a:stCxn id="17" idx="3"/>
+          </p:cNvCxnSpPr>
           <p:nvPr/>
         </p:nvCxnSpPr>
         <p:spPr>
           <a:xfrm>
-            <a:off x="6934200" y="723900"/>
-            <a:ext cx="2180376" cy="220511"/>
+            <a:off x="7001516" y="682308"/>
+            <a:ext cx="2302297" cy="301375"/>
           </a:xfrm>
           <a:prstGeom prst="straightConnector1">
             <a:avLst/>
@@ -4038,14 +4078,15 @@
             </a:extLst>
           </p:cNvPr>
           <p:cNvCxnSpPr>
+            <a:cxnSpLocks/>
             <a:stCxn id="19" idx="0"/>
           </p:cNvCxnSpPr>
           <p:nvPr/>
         </p:nvCxnSpPr>
         <p:spPr>
           <a:xfrm flipV="1">
-            <a:off x="8180703" y="1171575"/>
-            <a:ext cx="458472" cy="1578278"/>
+            <a:off x="8180703" y="1245786"/>
+            <a:ext cx="714521" cy="1504067"/>
           </a:xfrm>
           <a:prstGeom prst="straightConnector1">
             <a:avLst/>
@@ -4079,14 +4120,14 @@
             </a:extLst>
           </p:cNvPr>
           <p:cNvCxnSpPr>
-            <a:stCxn id="18" idx="0"/>
+            <a:cxnSpLocks/>
           </p:cNvCxnSpPr>
           <p:nvPr/>
         </p:nvCxnSpPr>
         <p:spPr>
           <a:xfrm flipH="1" flipV="1">
-            <a:off x="9515475" y="1674344"/>
-            <a:ext cx="448305" cy="1075509"/>
+            <a:off x="9829800" y="1674344"/>
+            <a:ext cx="133979" cy="1075510"/>
           </a:xfrm>
           <a:prstGeom prst="straightConnector1">
             <a:avLst/>

</xml_diff>

<commit_message>
Modificat schema de la arhitectura sistemului
</commit_message>
<xml_diff>
--- a/Template etichete modul senzor.pptx
+++ b/Template etichete modul senzor.pptx
@@ -261,7 +261,7 @@
           <a:p>
             <a:fld id="{34755551-83DF-4ECD-B6A6-BE8124057A96}" type="datetimeFigureOut">
               <a:rPr lang="en-US" smtClean="0"/>
-              <a:t>4/25/2021</a:t>
+              <a:t>5/17/2021</a:t>
             </a:fld>
             <a:endParaRPr lang="en-US"/>
           </a:p>
@@ -461,7 +461,7 @@
           <a:p>
             <a:fld id="{34755551-83DF-4ECD-B6A6-BE8124057A96}" type="datetimeFigureOut">
               <a:rPr lang="en-US" smtClean="0"/>
-              <a:t>4/25/2021</a:t>
+              <a:t>5/17/2021</a:t>
             </a:fld>
             <a:endParaRPr lang="en-US"/>
           </a:p>
@@ -671,7 +671,7 @@
           <a:p>
             <a:fld id="{34755551-83DF-4ECD-B6A6-BE8124057A96}" type="datetimeFigureOut">
               <a:rPr lang="en-US" smtClean="0"/>
-              <a:t>4/25/2021</a:t>
+              <a:t>5/17/2021</a:t>
             </a:fld>
             <a:endParaRPr lang="en-US"/>
           </a:p>
@@ -871,7 +871,7 @@
           <a:p>
             <a:fld id="{34755551-83DF-4ECD-B6A6-BE8124057A96}" type="datetimeFigureOut">
               <a:rPr lang="en-US" smtClean="0"/>
-              <a:t>4/25/2021</a:t>
+              <a:t>5/17/2021</a:t>
             </a:fld>
             <a:endParaRPr lang="en-US"/>
           </a:p>
@@ -1147,7 +1147,7 @@
           <a:p>
             <a:fld id="{34755551-83DF-4ECD-B6A6-BE8124057A96}" type="datetimeFigureOut">
               <a:rPr lang="en-US" smtClean="0"/>
-              <a:t>4/25/2021</a:t>
+              <a:t>5/17/2021</a:t>
             </a:fld>
             <a:endParaRPr lang="en-US"/>
           </a:p>
@@ -1415,7 +1415,7 @@
           <a:p>
             <a:fld id="{34755551-83DF-4ECD-B6A6-BE8124057A96}" type="datetimeFigureOut">
               <a:rPr lang="en-US" smtClean="0"/>
-              <a:t>4/25/2021</a:t>
+              <a:t>5/17/2021</a:t>
             </a:fld>
             <a:endParaRPr lang="en-US"/>
           </a:p>
@@ -1830,7 +1830,7 @@
           <a:p>
             <a:fld id="{34755551-83DF-4ECD-B6A6-BE8124057A96}" type="datetimeFigureOut">
               <a:rPr lang="en-US" smtClean="0"/>
-              <a:t>4/25/2021</a:t>
+              <a:t>5/17/2021</a:t>
             </a:fld>
             <a:endParaRPr lang="en-US"/>
           </a:p>
@@ -1972,7 +1972,7 @@
           <a:p>
             <a:fld id="{34755551-83DF-4ECD-B6A6-BE8124057A96}" type="datetimeFigureOut">
               <a:rPr lang="en-US" smtClean="0"/>
-              <a:t>4/25/2021</a:t>
+              <a:t>5/17/2021</a:t>
             </a:fld>
             <a:endParaRPr lang="en-US"/>
           </a:p>
@@ -2085,7 +2085,7 @@
           <a:p>
             <a:fld id="{34755551-83DF-4ECD-B6A6-BE8124057A96}" type="datetimeFigureOut">
               <a:rPr lang="en-US" smtClean="0"/>
-              <a:t>4/25/2021</a:t>
+              <a:t>5/17/2021</a:t>
             </a:fld>
             <a:endParaRPr lang="en-US"/>
           </a:p>
@@ -2398,7 +2398,7 @@
           <a:p>
             <a:fld id="{34755551-83DF-4ECD-B6A6-BE8124057A96}" type="datetimeFigureOut">
               <a:rPr lang="en-US" smtClean="0"/>
-              <a:t>4/25/2021</a:t>
+              <a:t>5/17/2021</a:t>
             </a:fld>
             <a:endParaRPr lang="en-US"/>
           </a:p>
@@ -2687,7 +2687,7 @@
           <a:p>
             <a:fld id="{34755551-83DF-4ECD-B6A6-BE8124057A96}" type="datetimeFigureOut">
               <a:rPr lang="en-US" smtClean="0"/>
-              <a:t>4/25/2021</a:t>
+              <a:t>5/17/2021</a:t>
             </a:fld>
             <a:endParaRPr lang="en-US"/>
           </a:p>
@@ -2930,7 +2930,7 @@
           <a:p>
             <a:fld id="{34755551-83DF-4ECD-B6A6-BE8124057A96}" type="datetimeFigureOut">
               <a:rPr lang="en-US" smtClean="0"/>
-              <a:t>4/25/2021</a:t>
+              <a:t>5/17/2021</a:t>
             </a:fld>
             <a:endParaRPr lang="en-US"/>
           </a:p>
@@ -3926,106 +3926,6 @@
           </a:p>
         </p:txBody>
       </p:sp>
-      <p:sp>
-        <p:nvSpPr>
-          <p:cNvPr id="18" name="Dreptunghi 17">
-            <a:extLst>
-              <a:ext uri="{FF2B5EF4-FFF2-40B4-BE49-F238E27FC236}">
-                <a16:creationId xmlns:a16="http://schemas.microsoft.com/office/drawing/2014/main" id="{D28A6687-9493-4E03-958A-0E89D134E0DC}"/>
-              </a:ext>
-            </a:extLst>
-          </p:cNvPr>
-          <p:cNvSpPr/>
-          <p:nvPr/>
-        </p:nvSpPr>
-        <p:spPr>
-          <a:xfrm>
-            <a:off x="9254798" y="2749853"/>
-            <a:ext cx="1417963" cy="524206"/>
-          </a:xfrm>
-          <a:prstGeom prst="rect">
-            <a:avLst/>
-          </a:prstGeom>
-        </p:spPr>
-        <p:style>
-          <a:lnRef idx="2">
-            <a:schemeClr val="accent1">
-              <a:shade val="50000"/>
-            </a:schemeClr>
-          </a:lnRef>
-          <a:fillRef idx="1">
-            <a:schemeClr val="accent1"/>
-          </a:fillRef>
-          <a:effectRef idx="0">
-            <a:schemeClr val="accent1"/>
-          </a:effectRef>
-          <a:fontRef idx="minor">
-            <a:schemeClr val="lt1"/>
-          </a:fontRef>
-        </p:style>
-        <p:txBody>
-          <a:bodyPr rtlCol="0" anchor="ctr"/>
-          <a:lstStyle/>
-          <a:p>
-            <a:pPr algn="ctr"/>
-            <a:r>
-              <a:rPr lang="ro-RO" dirty="0"/>
-              <a:t>Condensator</a:t>
-            </a:r>
-            <a:endParaRPr lang="en-US" dirty="0"/>
-          </a:p>
-        </p:txBody>
-      </p:sp>
-      <p:sp>
-        <p:nvSpPr>
-          <p:cNvPr id="19" name="Dreptunghi 18">
-            <a:extLst>
-              <a:ext uri="{FF2B5EF4-FFF2-40B4-BE49-F238E27FC236}">
-                <a16:creationId xmlns:a16="http://schemas.microsoft.com/office/drawing/2014/main" id="{89829D8E-7E3A-4247-892A-C147E17E6707}"/>
-              </a:ext>
-            </a:extLst>
-          </p:cNvPr>
-          <p:cNvSpPr/>
-          <p:nvPr/>
-        </p:nvSpPr>
-        <p:spPr>
-          <a:xfrm>
-            <a:off x="7608095" y="2749853"/>
-            <a:ext cx="1145216" cy="524206"/>
-          </a:xfrm>
-          <a:prstGeom prst="rect">
-            <a:avLst/>
-          </a:prstGeom>
-        </p:spPr>
-        <p:style>
-          <a:lnRef idx="2">
-            <a:schemeClr val="accent1">
-              <a:shade val="50000"/>
-            </a:schemeClr>
-          </a:lnRef>
-          <a:fillRef idx="1">
-            <a:schemeClr val="accent1"/>
-          </a:fillRef>
-          <a:effectRef idx="0">
-            <a:schemeClr val="accent1"/>
-          </a:effectRef>
-          <a:fontRef idx="minor">
-            <a:schemeClr val="lt1"/>
-          </a:fontRef>
-        </p:style>
-        <p:txBody>
-          <a:bodyPr rtlCol="0" anchor="ctr"/>
-          <a:lstStyle/>
-          <a:p>
-            <a:pPr algn="ctr"/>
-            <a:r>
-              <a:rPr lang="ro-RO" dirty="0"/>
-              <a:t>Rezistență</a:t>
-            </a:r>
-            <a:endParaRPr lang="en-US" dirty="0"/>
-          </a:p>
-        </p:txBody>
-      </p:sp>
       <p:cxnSp>
         <p:nvCxnSpPr>
           <p:cNvPr id="27" name="Conector drept cu săgeată 26">
@@ -4045,89 +3945,6 @@
           <a:xfrm>
             <a:off x="7001516" y="682308"/>
             <a:ext cx="2302297" cy="301375"/>
-          </a:xfrm>
-          <a:prstGeom prst="straightConnector1">
-            <a:avLst/>
-          </a:prstGeom>
-          <a:ln>
-            <a:tailEnd type="triangle"/>
-          </a:ln>
-        </p:spPr>
-        <p:style>
-          <a:lnRef idx="3">
-            <a:schemeClr val="accent1"/>
-          </a:lnRef>
-          <a:fillRef idx="0">
-            <a:schemeClr val="accent1"/>
-          </a:fillRef>
-          <a:effectRef idx="2">
-            <a:schemeClr val="accent1"/>
-          </a:effectRef>
-          <a:fontRef idx="minor">
-            <a:schemeClr val="tx1"/>
-          </a:fontRef>
-        </p:style>
-      </p:cxnSp>
-      <p:cxnSp>
-        <p:nvCxnSpPr>
-          <p:cNvPr id="29" name="Conector drept cu săgeată 28">
-            <a:extLst>
-              <a:ext uri="{FF2B5EF4-FFF2-40B4-BE49-F238E27FC236}">
-                <a16:creationId xmlns:a16="http://schemas.microsoft.com/office/drawing/2014/main" id="{DE2ED9DA-C0B7-41F9-8FAD-FC57FC10EB1E}"/>
-              </a:ext>
-            </a:extLst>
-          </p:cNvPr>
-          <p:cNvCxnSpPr>
-            <a:cxnSpLocks/>
-            <a:stCxn id="19" idx="0"/>
-          </p:cNvCxnSpPr>
-          <p:nvPr/>
-        </p:nvCxnSpPr>
-        <p:spPr>
-          <a:xfrm flipV="1">
-            <a:off x="8180703" y="1245786"/>
-            <a:ext cx="714521" cy="1504067"/>
-          </a:xfrm>
-          <a:prstGeom prst="straightConnector1">
-            <a:avLst/>
-          </a:prstGeom>
-          <a:ln>
-            <a:tailEnd type="triangle"/>
-          </a:ln>
-        </p:spPr>
-        <p:style>
-          <a:lnRef idx="3">
-            <a:schemeClr val="accent1"/>
-          </a:lnRef>
-          <a:fillRef idx="0">
-            <a:schemeClr val="accent1"/>
-          </a:fillRef>
-          <a:effectRef idx="2">
-            <a:schemeClr val="accent1"/>
-          </a:effectRef>
-          <a:fontRef idx="minor">
-            <a:schemeClr val="tx1"/>
-          </a:fontRef>
-        </p:style>
-      </p:cxnSp>
-      <p:cxnSp>
-        <p:nvCxnSpPr>
-          <p:cNvPr id="31" name="Conector drept cu săgeată 30">
-            <a:extLst>
-              <a:ext uri="{FF2B5EF4-FFF2-40B4-BE49-F238E27FC236}">
-                <a16:creationId xmlns:a16="http://schemas.microsoft.com/office/drawing/2014/main" id="{0E7F62E0-7514-45B6-A08B-F5493B39AB54}"/>
-              </a:ext>
-            </a:extLst>
-          </p:cNvPr>
-          <p:cNvCxnSpPr>
-            <a:cxnSpLocks/>
-          </p:cNvCxnSpPr>
-          <p:nvPr/>
-        </p:nvCxnSpPr>
-        <p:spPr>
-          <a:xfrm flipH="1" flipV="1">
-            <a:off x="9829800" y="1674344"/>
-            <a:ext cx="133979" cy="1075510"/>
           </a:xfrm>
           <a:prstGeom prst="straightConnector1">
             <a:avLst/>

</xml_diff>